<commit_message>
make updates in modellling
</commit_message>
<xml_diff>
--- a/Doc/questions_leon_group1_06_05_2020.pptx
+++ b/Doc/questions_leon_group1_06_05_2020.pptx
@@ -6,7 +6,9 @@
   </p:sldMasterIdLst>
   <p:sldIdLst>
     <p:sldId id="256" r:id="rId2"/>
-    <p:sldId id="257" r:id="rId3"/>
+    <p:sldId id="259" r:id="rId3"/>
+    <p:sldId id="257" r:id="rId4"/>
+    <p:sldId id="258" r:id="rId5"/>
   </p:sldIdLst>
   <p:sldSz cx="12192000" cy="6858000"/>
   <p:notesSz cx="6858000" cy="9144000"/>
@@ -3378,6 +3380,89 @@
           <p:cNvPr id="2" name="Title 1">
             <a:extLst>
               <a:ext uri="{FF2B5EF4-FFF2-40B4-BE49-F238E27FC236}">
+                <a16:creationId xmlns:a16="http://schemas.microsoft.com/office/drawing/2014/main" id="{2A3B40B0-853D-9241-954D-DF2CBCC5A56D}"/>
+              </a:ext>
+            </a:extLst>
+          </p:cNvPr>
+          <p:cNvSpPr>
+            <a:spLocks noGrp="1"/>
+          </p:cNvSpPr>
+          <p:nvPr>
+            <p:ph type="title"/>
+          </p:nvPr>
+        </p:nvSpPr>
+        <p:spPr/>
+        <p:txBody>
+          <a:bodyPr/>
+          <a:lstStyle/>
+          <a:p>
+            <a:r>
+              <a:rPr lang="en-US" dirty="0"/>
+              <a:t>General results </a:t>
+            </a:r>
+          </a:p>
+        </p:txBody>
+      </p:sp>
+      <p:sp>
+        <p:nvSpPr>
+          <p:cNvPr id="3" name="Content Placeholder 2">
+            <a:extLst>
+              <a:ext uri="{FF2B5EF4-FFF2-40B4-BE49-F238E27FC236}">
+                <a16:creationId xmlns:a16="http://schemas.microsoft.com/office/drawing/2014/main" id="{D35851B5-5AF7-6244-A683-0DBBD6176008}"/>
+              </a:ext>
+            </a:extLst>
+          </p:cNvPr>
+          <p:cNvSpPr>
+            <a:spLocks noGrp="1"/>
+          </p:cNvSpPr>
+          <p:nvPr>
+            <p:ph idx="1"/>
+          </p:nvPr>
+        </p:nvSpPr>
+        <p:spPr/>
+        <p:txBody>
+          <a:bodyPr/>
+          <a:lstStyle/>
+          <a:p>
+            <a:endParaRPr lang="en-US"/>
+          </a:p>
+        </p:txBody>
+      </p:sp>
+    </p:spTree>
+    <p:extLst>
+      <p:ext uri="{BB962C8B-B14F-4D97-AF65-F5344CB8AC3E}">
+        <p14:creationId xmlns:p14="http://schemas.microsoft.com/office/powerpoint/2010/main" val="2007093408"/>
+      </p:ext>
+    </p:extLst>
+  </p:cSld>
+  <p:clrMapOvr>
+    <a:masterClrMapping/>
+  </p:clrMapOvr>
+</p:sld>
+</file>
+
+<file path=ppt/slides/slide3.xml><?xml version="1.0" encoding="utf-8"?>
+<p:sld xmlns:a="http://schemas.openxmlformats.org/drawingml/2006/main" xmlns:r="http://schemas.openxmlformats.org/officeDocument/2006/relationships" xmlns:p="http://schemas.openxmlformats.org/presentationml/2006/main">
+  <p:cSld>
+    <p:spTree>
+      <p:nvGrpSpPr>
+        <p:cNvPr id="1" name=""/>
+        <p:cNvGrpSpPr/>
+        <p:nvPr/>
+      </p:nvGrpSpPr>
+      <p:grpSpPr>
+        <a:xfrm>
+          <a:off x="0" y="0"/>
+          <a:ext cx="0" cy="0"/>
+          <a:chOff x="0" y="0"/>
+          <a:chExt cx="0" cy="0"/>
+        </a:xfrm>
+      </p:grpSpPr>
+      <p:sp>
+        <p:nvSpPr>
+          <p:cNvPr id="2" name="Title 1">
+            <a:extLst>
+              <a:ext uri="{FF2B5EF4-FFF2-40B4-BE49-F238E27FC236}">
                 <a16:creationId xmlns:a16="http://schemas.microsoft.com/office/drawing/2014/main" id="{DBBB0C97-409B-B444-8B2D-5BEF1DA5CCD4}"/>
               </a:ext>
             </a:extLst>
@@ -3396,13 +3481,8 @@
           <a:p>
             <a:r>
               <a:rPr lang="en-US" dirty="0"/>
-              <a:t>Questions…. </a:t>
-            </a:r>
-            <a:r>
-              <a:rPr lang="en-US"/>
-              <a:t>What to do :/ </a:t>
-            </a:r>
-            <a:endParaRPr lang="en-US" dirty="0"/>
+              <a:t>Questions…. What to do :/ </a:t>
+            </a:r>
           </a:p>
         </p:txBody>
       </p:sp>
@@ -3439,6 +3519,89 @@
     <p:extLst>
       <p:ext uri="{BB962C8B-B14F-4D97-AF65-F5344CB8AC3E}">
         <p14:creationId xmlns:p14="http://schemas.microsoft.com/office/powerpoint/2010/main" val="3562431373"/>
+      </p:ext>
+    </p:extLst>
+  </p:cSld>
+  <p:clrMapOvr>
+    <a:masterClrMapping/>
+  </p:clrMapOvr>
+</p:sld>
+</file>
+
+<file path=ppt/slides/slide4.xml><?xml version="1.0" encoding="utf-8"?>
+<p:sld xmlns:a="http://schemas.openxmlformats.org/drawingml/2006/main" xmlns:r="http://schemas.openxmlformats.org/officeDocument/2006/relationships" xmlns:p="http://schemas.openxmlformats.org/presentationml/2006/main">
+  <p:cSld>
+    <p:spTree>
+      <p:nvGrpSpPr>
+        <p:cNvPr id="1" name=""/>
+        <p:cNvGrpSpPr/>
+        <p:nvPr/>
+      </p:nvGrpSpPr>
+      <p:grpSpPr>
+        <a:xfrm>
+          <a:off x="0" y="0"/>
+          <a:ext cx="0" cy="0"/>
+          <a:chOff x="0" y="0"/>
+          <a:chExt cx="0" cy="0"/>
+        </a:xfrm>
+      </p:grpSpPr>
+      <p:sp>
+        <p:nvSpPr>
+          <p:cNvPr id="2" name="Title 1">
+            <a:extLst>
+              <a:ext uri="{FF2B5EF4-FFF2-40B4-BE49-F238E27FC236}">
+                <a16:creationId xmlns:a16="http://schemas.microsoft.com/office/drawing/2014/main" id="{FF96C6A5-8BC5-9C48-B889-D462CE461FEB}"/>
+              </a:ext>
+            </a:extLst>
+          </p:cNvPr>
+          <p:cNvSpPr>
+            <a:spLocks noGrp="1"/>
+          </p:cNvSpPr>
+          <p:nvPr>
+            <p:ph type="title"/>
+          </p:nvPr>
+        </p:nvSpPr>
+        <p:spPr/>
+        <p:txBody>
+          <a:bodyPr/>
+          <a:lstStyle/>
+          <a:p>
+            <a:r>
+              <a:rPr lang="en-US" dirty="0"/>
+              <a:t>Modelling </a:t>
+            </a:r>
+          </a:p>
+        </p:txBody>
+      </p:sp>
+      <p:sp>
+        <p:nvSpPr>
+          <p:cNvPr id="3" name="Content Placeholder 2">
+            <a:extLst>
+              <a:ext uri="{FF2B5EF4-FFF2-40B4-BE49-F238E27FC236}">
+                <a16:creationId xmlns:a16="http://schemas.microsoft.com/office/drawing/2014/main" id="{85C00FA7-8AC5-174F-9976-DECB2E51BBAD}"/>
+              </a:ext>
+            </a:extLst>
+          </p:cNvPr>
+          <p:cNvSpPr>
+            <a:spLocks noGrp="1"/>
+          </p:cNvSpPr>
+          <p:nvPr>
+            <p:ph idx="1"/>
+          </p:nvPr>
+        </p:nvSpPr>
+        <p:spPr/>
+        <p:txBody>
+          <a:bodyPr/>
+          <a:lstStyle/>
+          <a:p>
+            <a:endParaRPr lang="en-US" dirty="0"/>
+          </a:p>
+        </p:txBody>
+      </p:sp>
+    </p:spTree>
+    <p:extLst>
+      <p:ext uri="{BB962C8B-B14F-4D97-AF65-F5344CB8AC3E}">
+        <p14:creationId xmlns:p14="http://schemas.microsoft.com/office/powerpoint/2010/main" val="2168355034"/>
       </p:ext>
     </p:extLst>
   </p:cSld>

</xml_diff>

<commit_message>
update roc curves and save plot
</commit_message>
<xml_diff>
--- a/Doc/questions_leon_group1_06_05_2020.pptx
+++ b/Doc/questions_leon_group1_06_05_2020.pptx
@@ -3561,43 +3561,53 @@
             <p:ph type="title"/>
           </p:nvPr>
         </p:nvSpPr>
-        <p:spPr/>
+        <p:spPr>
+          <a:xfrm>
+            <a:off x="152400" y="-190929"/>
+            <a:ext cx="10515600" cy="1325563"/>
+          </a:xfrm>
+        </p:spPr>
         <p:txBody>
           <a:bodyPr/>
           <a:lstStyle/>
           <a:p>
             <a:r>
               <a:rPr lang="en-US" dirty="0"/>
-              <a:t>Modelling </a:t>
-            </a:r>
-          </a:p>
-        </p:txBody>
-      </p:sp>
-      <p:sp>
-        <p:nvSpPr>
-          <p:cNvPr id="3" name="Content Placeholder 2">
-            <a:extLst>
-              <a:ext uri="{FF2B5EF4-FFF2-40B4-BE49-F238E27FC236}">
-                <a16:creationId xmlns:a16="http://schemas.microsoft.com/office/drawing/2014/main" id="{85C00FA7-8AC5-174F-9976-DECB2E51BBAD}"/>
-              </a:ext>
-            </a:extLst>
-          </p:cNvPr>
-          <p:cNvSpPr>
-            <a:spLocks noGrp="1"/>
-          </p:cNvSpPr>
-          <p:nvPr>
-            <p:ph idx="1"/>
-          </p:nvPr>
-        </p:nvSpPr>
-        <p:spPr/>
-        <p:txBody>
-          <a:bodyPr/>
-          <a:lstStyle/>
-          <a:p>
-            <a:endParaRPr lang="en-US" dirty="0"/>
-          </a:p>
-        </p:txBody>
-      </p:sp>
+              <a:t>Modelling ?? :/  </a:t>
+            </a:r>
+          </a:p>
+        </p:txBody>
+      </p:sp>
+      <p:pic>
+        <p:nvPicPr>
+          <p:cNvPr id="7" name="Picture 6">
+            <a:extLst>
+              <a:ext uri="{FF2B5EF4-FFF2-40B4-BE49-F238E27FC236}">
+                <a16:creationId xmlns:a16="http://schemas.microsoft.com/office/drawing/2014/main" id="{0AFF7A1A-1B4C-A249-ABFC-B87F5BDA8A6B}"/>
+              </a:ext>
+            </a:extLst>
+          </p:cNvPr>
+          <p:cNvPicPr>
+            <a:picLocks noChangeAspect="1"/>
+          </p:cNvPicPr>
+          <p:nvPr/>
+        </p:nvPicPr>
+        <p:blipFill>
+          <a:blip r:embed="rId2"/>
+          <a:stretch>
+            <a:fillRect/>
+          </a:stretch>
+        </p:blipFill>
+        <p:spPr>
+          <a:xfrm>
+            <a:off x="1227438" y="953766"/>
+            <a:ext cx="9144000" cy="5486400"/>
+          </a:xfrm>
+          <a:prstGeom prst="rect">
+            <a:avLst/>
+          </a:prstGeom>
+        </p:spPr>
+      </p:pic>
     </p:spTree>
     <p:extLst>
       <p:ext uri="{BB962C8B-B14F-4D97-AF65-F5344CB8AC3E}">

</xml_diff>

<commit_message>
Make fast html with all plots
</commit_message>
<xml_diff>
--- a/Doc/questions_leon_group1_06_05_2020.pptx
+++ b/Doc/questions_leon_group1_06_05_2020.pptx
@@ -5,10 +5,10 @@
     <p:sldMasterId id="2147483648" r:id="rId1"/>
   </p:sldMasterIdLst>
   <p:sldIdLst>
-    <p:sldId id="256" r:id="rId2"/>
-    <p:sldId id="259" r:id="rId3"/>
-    <p:sldId id="257" r:id="rId4"/>
-    <p:sldId id="258" r:id="rId5"/>
+    <p:sldId id="259" r:id="rId2"/>
+    <p:sldId id="257" r:id="rId3"/>
+    <p:sldId id="258" r:id="rId4"/>
+    <p:sldId id="260" r:id="rId5"/>
   </p:sldIdLst>
   <p:sldSz cx="12192000" cy="6858000"/>
   <p:notesSz cx="6858000" cy="9144000"/>
@@ -3345,10 +3345,63 @@
           <a:chExt cx="0" cy="0"/>
         </a:xfrm>
       </p:grpSpPr>
+      <p:sp>
+        <p:nvSpPr>
+          <p:cNvPr id="2" name="Title 1">
+            <a:extLst>
+              <a:ext uri="{FF2B5EF4-FFF2-40B4-BE49-F238E27FC236}">
+                <a16:creationId xmlns:a16="http://schemas.microsoft.com/office/drawing/2014/main" id="{E29368F2-064B-A248-9058-AB83C01D5715}"/>
+              </a:ext>
+            </a:extLst>
+          </p:cNvPr>
+          <p:cNvSpPr>
+            <a:spLocks noGrp="1"/>
+          </p:cNvSpPr>
+          <p:nvPr>
+            <p:ph type="title"/>
+          </p:nvPr>
+        </p:nvSpPr>
+        <p:spPr/>
+        <p:txBody>
+          <a:bodyPr/>
+          <a:lstStyle/>
+          <a:p>
+            <a:r>
+              <a:rPr lang="en-US" dirty="0"/>
+              <a:t>Group 1 project </a:t>
+            </a:r>
+          </a:p>
+        </p:txBody>
+      </p:sp>
+      <p:sp>
+        <p:nvSpPr>
+          <p:cNvPr id="3" name="Content Placeholder 2">
+            <a:extLst>
+              <a:ext uri="{FF2B5EF4-FFF2-40B4-BE49-F238E27FC236}">
+                <a16:creationId xmlns:a16="http://schemas.microsoft.com/office/drawing/2014/main" id="{EFA22533-AF46-EF46-9FDB-484C5CBA9D0D}"/>
+              </a:ext>
+            </a:extLst>
+          </p:cNvPr>
+          <p:cNvSpPr>
+            <a:spLocks noGrp="1"/>
+          </p:cNvSpPr>
+          <p:nvPr>
+            <p:ph idx="1"/>
+          </p:nvPr>
+        </p:nvSpPr>
+        <p:spPr/>
+        <p:txBody>
+          <a:bodyPr/>
+          <a:lstStyle/>
+          <a:p>
+            <a:endParaRPr lang="en-US"/>
+          </a:p>
+        </p:txBody>
+      </p:sp>
     </p:spTree>
     <p:extLst>
       <p:ext uri="{BB962C8B-B14F-4D97-AF65-F5344CB8AC3E}">
-        <p14:creationId xmlns:p14="http://schemas.microsoft.com/office/powerpoint/2010/main" val="3348538393"/>
+        <p14:creationId xmlns:p14="http://schemas.microsoft.com/office/powerpoint/2010/main" val="818954425"/>
       </p:ext>
     </p:extLst>
   </p:cSld>
@@ -3380,7 +3433,7 @@
           <p:cNvPr id="2" name="Title 1">
             <a:extLst>
               <a:ext uri="{FF2B5EF4-FFF2-40B4-BE49-F238E27FC236}">
-                <a16:creationId xmlns:a16="http://schemas.microsoft.com/office/drawing/2014/main" id="{2A3B40B0-853D-9241-954D-DF2CBCC5A56D}"/>
+                <a16:creationId xmlns:a16="http://schemas.microsoft.com/office/drawing/2014/main" id="{DBBB0C97-409B-B444-8B2D-5BEF1DA5CCD4}"/>
               </a:ext>
             </a:extLst>
           </p:cNvPr>
@@ -3397,92 +3450,10 @@
           <a:lstStyle/>
           <a:p>
             <a:r>
-              <a:rPr lang="en-US" dirty="0"/>
-              <a:t>General results </a:t>
-            </a:r>
-          </a:p>
-        </p:txBody>
-      </p:sp>
-      <p:sp>
-        <p:nvSpPr>
-          <p:cNvPr id="3" name="Content Placeholder 2">
-            <a:extLst>
-              <a:ext uri="{FF2B5EF4-FFF2-40B4-BE49-F238E27FC236}">
-                <a16:creationId xmlns:a16="http://schemas.microsoft.com/office/drawing/2014/main" id="{D35851B5-5AF7-6244-A683-0DBBD6176008}"/>
-              </a:ext>
-            </a:extLst>
-          </p:cNvPr>
-          <p:cNvSpPr>
-            <a:spLocks noGrp="1"/>
-          </p:cNvSpPr>
-          <p:nvPr>
-            <p:ph idx="1"/>
-          </p:nvPr>
-        </p:nvSpPr>
-        <p:spPr/>
-        <p:txBody>
-          <a:bodyPr/>
-          <a:lstStyle/>
-          <a:p>
-            <a:endParaRPr lang="en-US"/>
-          </a:p>
-        </p:txBody>
-      </p:sp>
-    </p:spTree>
-    <p:extLst>
-      <p:ext uri="{BB962C8B-B14F-4D97-AF65-F5344CB8AC3E}">
-        <p14:creationId xmlns:p14="http://schemas.microsoft.com/office/powerpoint/2010/main" val="2007093408"/>
-      </p:ext>
-    </p:extLst>
-  </p:cSld>
-  <p:clrMapOvr>
-    <a:masterClrMapping/>
-  </p:clrMapOvr>
-</p:sld>
-</file>
-
-<file path=ppt/slides/slide3.xml><?xml version="1.0" encoding="utf-8"?>
-<p:sld xmlns:a="http://schemas.openxmlformats.org/drawingml/2006/main" xmlns:r="http://schemas.openxmlformats.org/officeDocument/2006/relationships" xmlns:p="http://schemas.openxmlformats.org/presentationml/2006/main">
-  <p:cSld>
-    <p:spTree>
-      <p:nvGrpSpPr>
-        <p:cNvPr id="1" name=""/>
-        <p:cNvGrpSpPr/>
-        <p:nvPr/>
-      </p:nvGrpSpPr>
-      <p:grpSpPr>
-        <a:xfrm>
-          <a:off x="0" y="0"/>
-          <a:ext cx="0" cy="0"/>
-          <a:chOff x="0" y="0"/>
-          <a:chExt cx="0" cy="0"/>
-        </a:xfrm>
-      </p:grpSpPr>
-      <p:sp>
-        <p:nvSpPr>
-          <p:cNvPr id="2" name="Title 1">
-            <a:extLst>
-              <a:ext uri="{FF2B5EF4-FFF2-40B4-BE49-F238E27FC236}">
-                <a16:creationId xmlns:a16="http://schemas.microsoft.com/office/drawing/2014/main" id="{DBBB0C97-409B-B444-8B2D-5BEF1DA5CCD4}"/>
-              </a:ext>
-            </a:extLst>
-          </p:cNvPr>
-          <p:cNvSpPr>
-            <a:spLocks noGrp="1"/>
-          </p:cNvSpPr>
-          <p:nvPr>
-            <p:ph type="title"/>
-          </p:nvPr>
-        </p:nvSpPr>
-        <p:spPr/>
-        <p:txBody>
-          <a:bodyPr/>
-          <a:lstStyle/>
-          <a:p>
-            <a:r>
-              <a:rPr lang="en-US" dirty="0"/>
-              <a:t>Questions…. What to do :/ </a:t>
-            </a:r>
+              <a:rPr lang="en-US" dirty="0" err="1"/>
+              <a:t>ggseqlogo</a:t>
+            </a:r>
+            <a:endParaRPr lang="en-US" dirty="0"/>
           </a:p>
         </p:txBody>
       </p:sp>
@@ -3528,7 +3499,7 @@
 </p:sld>
 </file>
 
-<file path=ppt/slides/slide4.xml><?xml version="1.0" encoding="utf-8"?>
+<file path=ppt/slides/slide3.xml><?xml version="1.0" encoding="utf-8"?>
 <p:sld xmlns:a="http://schemas.openxmlformats.org/drawingml/2006/main" xmlns:r="http://schemas.openxmlformats.org/officeDocument/2006/relationships" xmlns:p="http://schemas.openxmlformats.org/presentationml/2006/main">
   <p:cSld>
     <p:spTree>
@@ -3612,6 +3583,131 @@
     <p:extLst>
       <p:ext uri="{BB962C8B-B14F-4D97-AF65-F5344CB8AC3E}">
         <p14:creationId xmlns:p14="http://schemas.microsoft.com/office/powerpoint/2010/main" val="2168355034"/>
+      </p:ext>
+    </p:extLst>
+  </p:cSld>
+  <p:clrMapOvr>
+    <a:masterClrMapping/>
+  </p:clrMapOvr>
+</p:sld>
+</file>
+
+<file path=ppt/slides/slide4.xml><?xml version="1.0" encoding="utf-8"?>
+<p:sld xmlns:a="http://schemas.openxmlformats.org/drawingml/2006/main" xmlns:r="http://schemas.openxmlformats.org/officeDocument/2006/relationships" xmlns:p="http://schemas.openxmlformats.org/presentationml/2006/main">
+  <p:cSld>
+    <p:spTree>
+      <p:nvGrpSpPr>
+        <p:cNvPr id="1" name=""/>
+        <p:cNvGrpSpPr/>
+        <p:nvPr/>
+      </p:nvGrpSpPr>
+      <p:grpSpPr>
+        <a:xfrm>
+          <a:off x="0" y="0"/>
+          <a:ext cx="0" cy="0"/>
+          <a:chOff x="0" y="0"/>
+          <a:chExt cx="0" cy="0"/>
+        </a:xfrm>
+      </p:grpSpPr>
+      <p:sp>
+        <p:nvSpPr>
+          <p:cNvPr id="2" name="Title 1">
+            <a:extLst>
+              <a:ext uri="{FF2B5EF4-FFF2-40B4-BE49-F238E27FC236}">
+                <a16:creationId xmlns:a16="http://schemas.microsoft.com/office/drawing/2014/main" id="{3D8F785D-F410-B44A-BD0B-5C0955309A71}"/>
+              </a:ext>
+            </a:extLst>
+          </p:cNvPr>
+          <p:cNvSpPr>
+            <a:spLocks noGrp="1"/>
+          </p:cNvSpPr>
+          <p:nvPr>
+            <p:ph type="title"/>
+          </p:nvPr>
+        </p:nvSpPr>
+        <p:spPr/>
+        <p:txBody>
+          <a:bodyPr/>
+          <a:lstStyle/>
+          <a:p>
+            <a:r>
+              <a:rPr lang="en-US" dirty="0"/>
+              <a:t>Other questions </a:t>
+            </a:r>
+          </a:p>
+        </p:txBody>
+      </p:sp>
+      <p:sp>
+        <p:nvSpPr>
+          <p:cNvPr id="3" name="Content Placeholder 2">
+            <a:extLst>
+              <a:ext uri="{FF2B5EF4-FFF2-40B4-BE49-F238E27FC236}">
+                <a16:creationId xmlns:a16="http://schemas.microsoft.com/office/drawing/2014/main" id="{D8B027D7-D5CC-164E-A73A-F6C8908F6B67}"/>
+              </a:ext>
+            </a:extLst>
+          </p:cNvPr>
+          <p:cNvSpPr>
+            <a:spLocks noGrp="1"/>
+          </p:cNvSpPr>
+          <p:nvPr>
+            <p:ph idx="1"/>
+          </p:nvPr>
+        </p:nvSpPr>
+        <p:spPr/>
+        <p:txBody>
+          <a:bodyPr/>
+          <a:lstStyle/>
+          <a:p>
+            <a:r>
+              <a:rPr lang="en-US" dirty="0"/>
+              <a:t>Force to ignore errors in source I </a:t>
+            </a:r>
+            <a:r>
+              <a:rPr lang="en-US" dirty="0" err="1"/>
+              <a:t>Rmd</a:t>
+            </a:r>
+            <a:r>
+              <a:rPr lang="en-US" dirty="0"/>
+              <a:t> </a:t>
+            </a:r>
+          </a:p>
+          <a:p>
+            <a:r>
+              <a:rPr lang="en-US" dirty="0"/>
+              <a:t>Shiny – insert blank option ? </a:t>
+            </a:r>
+          </a:p>
+          <a:p>
+            <a:r>
+              <a:rPr lang="en-US" dirty="0"/>
+              <a:t>Do you want anything specific according to the </a:t>
+            </a:r>
+            <a:r>
+              <a:rPr lang="en-US" dirty="0" err="1"/>
+              <a:t>github</a:t>
+            </a:r>
+            <a:r>
+              <a:rPr lang="en-US" dirty="0"/>
+              <a:t> page ? </a:t>
+            </a:r>
+          </a:p>
+          <a:p>
+            <a:r>
+              <a:rPr lang="en-US" dirty="0"/>
+              <a:t>What to put in </a:t>
+            </a:r>
+            <a:r>
+              <a:rPr lang="en-US"/>
+              <a:t>a packages ? </a:t>
+            </a:r>
+            <a:endParaRPr lang="en-US" dirty="0"/>
+          </a:p>
+        </p:txBody>
+      </p:sp>
+    </p:spTree>
+    <p:extLst>
+      <p:ext uri="{BB962C8B-B14F-4D97-AF65-F5344CB8AC3E}">
+        <p14:creationId xmlns:p14="http://schemas.microsoft.com/office/powerpoint/2010/main" val="2628108197"/>
       </p:ext>
     </p:extLst>
   </p:cSld>

</xml_diff>